<commit_message>
Files have been modified
</commit_message>
<xml_diff>
--- a/prezentacio/Adatkezelői webalkalmazás.pptx
+++ b/prezentacio/Adatkezelői webalkalmazás.pptx
@@ -318,7 +318,7 @@
           <a:p>
             <a:fld id="{92E9BFB7-2D21-40B0-8B71-5052CD66151B}" type="datetimeFigureOut">
               <a:rPr lang="hu-HU" smtClean="0"/>
-              <a:t>2025. 09. 07.</a:t>
+              <a:t>2025. 09. 21.</a:t>
             </a:fld>
             <a:endParaRPr lang="hu-HU"/>
           </a:p>
@@ -754,7 +754,7 @@
           <a:p>
             <a:fld id="{92E9BFB7-2D21-40B0-8B71-5052CD66151B}" type="datetimeFigureOut">
               <a:rPr lang="hu-HU" smtClean="0"/>
-              <a:t>2025. 09. 07.</a:t>
+              <a:t>2025. 09. 21.</a:t>
             </a:fld>
             <a:endParaRPr lang="hu-HU"/>
           </a:p>
@@ -1004,7 +1004,7 @@
           <a:p>
             <a:fld id="{92E9BFB7-2D21-40B0-8B71-5052CD66151B}" type="datetimeFigureOut">
               <a:rPr lang="hu-HU" smtClean="0"/>
-              <a:t>2025. 09. 07.</a:t>
+              <a:t>2025. 09. 21.</a:t>
             </a:fld>
             <a:endParaRPr lang="hu-HU"/>
           </a:p>
@@ -1312,7 +1312,7 @@
           <a:p>
             <a:fld id="{92E9BFB7-2D21-40B0-8B71-5052CD66151B}" type="datetimeFigureOut">
               <a:rPr lang="hu-HU" smtClean="0"/>
-              <a:t>2025. 09. 07.</a:t>
+              <a:t>2025. 09. 21.</a:t>
             </a:fld>
             <a:endParaRPr lang="hu-HU"/>
           </a:p>
@@ -1630,7 +1630,7 @@
           <a:p>
             <a:fld id="{92E9BFB7-2D21-40B0-8B71-5052CD66151B}" type="datetimeFigureOut">
               <a:rPr lang="hu-HU" smtClean="0"/>
-              <a:t>2025. 09. 07.</a:t>
+              <a:t>2025. 09. 21.</a:t>
             </a:fld>
             <a:endParaRPr lang="hu-HU"/>
           </a:p>
@@ -1932,7 +1932,7 @@
           <a:p>
             <a:fld id="{92E9BFB7-2D21-40B0-8B71-5052CD66151B}" type="datetimeFigureOut">
               <a:rPr lang="hu-HU" smtClean="0"/>
-              <a:t>2025. 09. 07.</a:t>
+              <a:t>2025. 09. 21.</a:t>
             </a:fld>
             <a:endParaRPr lang="hu-HU"/>
           </a:p>
@@ -2299,7 +2299,7 @@
           <a:p>
             <a:fld id="{92E9BFB7-2D21-40B0-8B71-5052CD66151B}" type="datetimeFigureOut">
               <a:rPr lang="hu-HU" smtClean="0"/>
-              <a:t>2025. 09. 07.</a:t>
+              <a:t>2025. 09. 21.</a:t>
             </a:fld>
             <a:endParaRPr lang="hu-HU"/>
           </a:p>
@@ -2473,7 +2473,7 @@
           <a:p>
             <a:fld id="{92E9BFB7-2D21-40B0-8B71-5052CD66151B}" type="datetimeFigureOut">
               <a:rPr lang="hu-HU" smtClean="0"/>
-              <a:t>2025. 09. 07.</a:t>
+              <a:t>2025. 09. 21.</a:t>
             </a:fld>
             <a:endParaRPr lang="hu-HU"/>
           </a:p>
@@ -2653,7 +2653,7 @@
           <a:p>
             <a:fld id="{92E9BFB7-2D21-40B0-8B71-5052CD66151B}" type="datetimeFigureOut">
               <a:rPr lang="hu-HU" smtClean="0"/>
-              <a:t>2025. 09. 07.</a:t>
+              <a:t>2025. 09. 21.</a:t>
             </a:fld>
             <a:endParaRPr lang="hu-HU"/>
           </a:p>
@@ -2823,7 +2823,7 @@
           <a:p>
             <a:fld id="{92E9BFB7-2D21-40B0-8B71-5052CD66151B}" type="datetimeFigureOut">
               <a:rPr lang="hu-HU" smtClean="0"/>
-              <a:t>2025. 09. 07.</a:t>
+              <a:t>2025. 09. 21.</a:t>
             </a:fld>
             <a:endParaRPr lang="hu-HU"/>
           </a:p>
@@ -3073,7 +3073,7 @@
           <a:p>
             <a:fld id="{92E9BFB7-2D21-40B0-8B71-5052CD66151B}" type="datetimeFigureOut">
               <a:rPr lang="hu-HU" smtClean="0"/>
-              <a:t>2025. 09. 07.</a:t>
+              <a:t>2025. 09. 21.</a:t>
             </a:fld>
             <a:endParaRPr lang="hu-HU"/>
           </a:p>
@@ -3309,7 +3309,7 @@
           <a:p>
             <a:fld id="{92E9BFB7-2D21-40B0-8B71-5052CD66151B}" type="datetimeFigureOut">
               <a:rPr lang="hu-HU" smtClean="0"/>
-              <a:t>2025. 09. 07.</a:t>
+              <a:t>2025. 09. 21.</a:t>
             </a:fld>
             <a:endParaRPr lang="hu-HU"/>
           </a:p>
@@ -3691,7 +3691,7 @@
           <a:p>
             <a:fld id="{92E9BFB7-2D21-40B0-8B71-5052CD66151B}" type="datetimeFigureOut">
               <a:rPr lang="hu-HU" smtClean="0"/>
-              <a:t>2025. 09. 07.</a:t>
+              <a:t>2025. 09. 21.</a:t>
             </a:fld>
             <a:endParaRPr lang="hu-HU"/>
           </a:p>
@@ -3809,7 +3809,7 @@
           <a:p>
             <a:fld id="{92E9BFB7-2D21-40B0-8B71-5052CD66151B}" type="datetimeFigureOut">
               <a:rPr lang="hu-HU" smtClean="0"/>
-              <a:t>2025. 09. 07.</a:t>
+              <a:t>2025. 09. 21.</a:t>
             </a:fld>
             <a:endParaRPr lang="hu-HU"/>
           </a:p>
@@ -3904,7 +3904,7 @@
           <a:p>
             <a:fld id="{92E9BFB7-2D21-40B0-8B71-5052CD66151B}" type="datetimeFigureOut">
               <a:rPr lang="hu-HU" smtClean="0"/>
-              <a:t>2025. 09. 07.</a:t>
+              <a:t>2025. 09. 21.</a:t>
             </a:fld>
             <a:endParaRPr lang="hu-HU"/>
           </a:p>
@@ -4159,7 +4159,7 @@
           <a:p>
             <a:fld id="{92E9BFB7-2D21-40B0-8B71-5052CD66151B}" type="datetimeFigureOut">
               <a:rPr lang="hu-HU" smtClean="0"/>
-              <a:t>2025. 09. 07.</a:t>
+              <a:t>2025. 09. 21.</a:t>
             </a:fld>
             <a:endParaRPr lang="hu-HU"/>
           </a:p>
@@ -4442,7 +4442,7 @@
           <a:p>
             <a:fld id="{92E9BFB7-2D21-40B0-8B71-5052CD66151B}" type="datetimeFigureOut">
               <a:rPr lang="hu-HU" smtClean="0"/>
-              <a:t>2025. 09. 07.</a:t>
+              <a:t>2025. 09. 21.</a:t>
             </a:fld>
             <a:endParaRPr lang="hu-HU"/>
           </a:p>
@@ -4848,7 +4848,7 @@
           <a:p>
             <a:fld id="{92E9BFB7-2D21-40B0-8B71-5052CD66151B}" type="datetimeFigureOut">
               <a:rPr lang="hu-HU" smtClean="0"/>
-              <a:t>2025. 09. 07.</a:t>
+              <a:t>2025. 09. 21.</a:t>
             </a:fld>
             <a:endParaRPr lang="hu-HU"/>
           </a:p>
@@ -5450,7 +5450,7 @@
           <a:p>
             <a:r>
               <a:rPr lang="hu-HU" dirty="0"/>
-              <a:t>Lekka Sándor</a:t>
+              <a:t>Lekka Sándor és Grósz Ferenc Dániel</a:t>
             </a:r>
           </a:p>
           <a:p>
@@ -9016,7 +9016,7 @@
             </a:pPr>
             <a:r>
               <a:rPr lang="hu-HU" dirty="0"/>
-              <a:t>A webalkalmazás fejlesztése során több technológiai kihívással kellett szembenéznem, amelyek hozzájárultak szakmai fejlődésemhez:</a:t>
+              <a:t>A webalkalmazás fejlesztése során több technológiai kihívással kellett szembenéznünk, amelyek hozzájárultak szakmai fejlődésünkhöz:</a:t>
             </a:r>
           </a:p>
           <a:p>
@@ -9419,8 +9419,8 @@
         </p:nvSpPr>
         <p:spPr>
           <a:xfrm>
-            <a:off x="840115" y="1601492"/>
-            <a:ext cx="4059876" cy="3496025"/>
+            <a:off x="634516" y="1601493"/>
+            <a:ext cx="5309083" cy="2871896"/>
           </a:xfrm>
           <a:prstGeom prst="rect">
             <a:avLst/>
@@ -9662,7 +9662,7 @@
             </a:pPr>
             <a:r>
               <a:rPr lang="hu-HU" sz="1600" dirty="0"/>
-              <a:t>Tesztelő neve: Lekka Sándor</a:t>
+              <a:t>Tesztelő neve: Lekka Sándor, Grósz Ferenc Dániel</a:t>
             </a:r>
           </a:p>
           <a:p>
@@ -12227,7 +12227,7 @@
                   <a:schemeClr val="bg1"/>
                 </a:solidFill>
               </a:rPr>
-              <a:t>, I </a:t>
+              <a:t>, </a:t>
             </a:r>
             <a:r>
               <a:rPr lang="hu-HU" dirty="0" err="1">
@@ -12235,6 +12235,22 @@
                   <a:schemeClr val="bg1"/>
                 </a:solidFill>
               </a:rPr>
+              <a:t>we</a:t>
+            </a:r>
+            <a:r>
+              <a:rPr lang="hu-HU" dirty="0">
+                <a:solidFill>
+                  <a:schemeClr val="bg1"/>
+                </a:solidFill>
+              </a:rPr>
+              <a:t> </a:t>
+            </a:r>
+            <a:r>
+              <a:rPr lang="hu-HU" dirty="0" err="1">
+                <a:solidFill>
+                  <a:schemeClr val="bg1"/>
+                </a:solidFill>
+              </a:rPr>
               <a:t>would</a:t>
             </a:r>
             <a:r>
@@ -12315,7 +12331,7 @@
                   <a:schemeClr val="bg1"/>
                 </a:solidFill>
               </a:rPr>
-              <a:t>my</a:t>
+              <a:t>our</a:t>
             </a:r>
             <a:r>
               <a:rPr lang="hu-HU" dirty="0">
@@ -12351,12 +12367,20 @@
           </a:p>
           <a:p>
             <a:r>
+              <a:rPr lang="hu-HU" dirty="0" err="1">
+                <a:solidFill>
+                  <a:schemeClr val="bg1"/>
+                </a:solidFill>
+              </a:rPr>
+              <a:t>We</a:t>
+            </a:r>
+            <a:r>
               <a:rPr lang="hu-HU" dirty="0">
                 <a:solidFill>
                   <a:schemeClr val="bg1"/>
                 </a:solidFill>
               </a:rPr>
-              <a:t>I </a:t>
+              <a:t> </a:t>
             </a:r>
             <a:r>
               <a:rPr lang="hu-HU" dirty="0" err="1">
@@ -12524,7 +12548,7 @@
                   <a:schemeClr val="bg1"/>
                 </a:solidFill>
               </a:rPr>
-              <a:t>me</a:t>
+              <a:t>us</a:t>
             </a:r>
             <a:r>
               <a:rPr lang="hu-HU" dirty="0">
@@ -12998,7 +13022,23 @@
                   <a:schemeClr val="bg1"/>
                 </a:solidFill>
               </a:rPr>
-              <a:t>, I </a:t>
+              <a:t>, </a:t>
+            </a:r>
+            <a:r>
+              <a:rPr lang="hu-HU" dirty="0" err="1">
+                <a:solidFill>
+                  <a:schemeClr val="bg1"/>
+                </a:solidFill>
+              </a:rPr>
+              <a:t>we</a:t>
+            </a:r>
+            <a:r>
+              <a:rPr lang="hu-HU" dirty="0">
+                <a:solidFill>
+                  <a:schemeClr val="bg1"/>
+                </a:solidFill>
+              </a:rPr>
+              <a:t> </a:t>
             </a:r>
             <a:r>
               <a:rPr lang="hu-HU" dirty="0" err="1">
@@ -13270,7 +13310,7 @@
                   <a:schemeClr val="bg1"/>
                 </a:solidFill>
               </a:rPr>
-              <a:t>me</a:t>
+              <a:t>us</a:t>
             </a:r>
             <a:r>
               <a:rPr lang="hu-HU" dirty="0">
@@ -14265,7 +14305,7 @@
                   <a:schemeClr val="bg1"/>
                 </a:solidFill>
               </a:rPr>
-              <a:t> 180 </a:t>
+              <a:t> 120 </a:t>
             </a:r>
             <a:r>
               <a:rPr lang="hu-HU" dirty="0" err="1">
@@ -14696,7 +14736,7 @@
           <a:p>
             <a:r>
               <a:rPr lang="hu-HU" dirty="0"/>
-              <a:t>Köszönöm a megtisztelő figyelmet!</a:t>
+              <a:t>Köszönjük a megtisztelő figyelmet!</a:t>
             </a:r>
           </a:p>
         </p:txBody>
@@ -14894,7 +14934,7 @@
             <a:pPr algn="just"/>
             <a:r>
               <a:rPr lang="hu-HU" dirty="0"/>
-              <a:t>A cégnek kb. 180 dolgozója van, ezért az ő adataik kezeléséért felelős </a:t>
+              <a:t>A cégnek kb. 120 dolgozója van, ezért az ő adataik kezeléséért felelős </a:t>
             </a:r>
             <a:r>
               <a:rPr lang="hu-HU" b="1" dirty="0"/>
@@ -15167,7 +15207,7 @@
             </a:pPr>
             <a:r>
               <a:rPr lang="hu-HU" dirty="0"/>
-              <a:t>A következő prezentációban egy olyan projectet mutatnék be, melynek ötlete a munkámhoz kapcsolódik.</a:t>
+              <a:t>A következő prezentációban egy olyan projectet mutatnánk be, melynek ötlete a munkánkhoz kapcsolódik.</a:t>
             </a:r>
           </a:p>
           <a:p>
@@ -15176,7 +15216,7 @@
             </a:pPr>
             <a:r>
               <a:rPr lang="hu-HU" dirty="0"/>
-              <a:t>A projekt témájául egy adatkezelői webalkalmazást választottam, mivel lehetőséget kínált arra, hogy komplex, valós életből vett problémára fejlesszek digitális megoldást.</a:t>
+              <a:t>A projekt témájául egy adatkezelői webalkalmazást választottunk, mivel lehetőséget kínált arra, hogy komplex, valós életből vett problémára fejlesszünk digitális megoldást.</a:t>
             </a:r>
           </a:p>
           <a:p>
@@ -15194,7 +15234,7 @@
             </a:pPr>
             <a:r>
               <a:rPr lang="hu-HU" dirty="0"/>
-              <a:t>A fejlesztés során mélyebb ismereteket szereztem a webfejlesztés különböző területein – beleértve a frontend és backend technológiákat, mint a JavaScript, PHP, </a:t>
+              <a:t>A fejlesztés során mélyebb ismereteket szereztünk a webfejlesztés különböző területein – beleértve a frontend és backend technológiákat, mint a JavaScript, PHP, </a:t>
             </a:r>
             <a:r>
               <a:rPr lang="hu-HU" dirty="0" err="1"/>
@@ -15210,7 +15250,15 @@
             </a:r>
             <a:r>
               <a:rPr lang="hu-HU" dirty="0"/>
-              <a:t> használata –, ezáltal átfogóbb képet kaptam a modern webalkalmazások működéséről és fejlesztési folyamatairól.  </a:t>
+              <a:t> használata –, ezáltal átfogóbb képet </a:t>
+            </a:r>
+            <a:r>
+              <a:rPr lang="hu-HU" dirty="0" err="1"/>
+              <a:t>kapthattunk</a:t>
+            </a:r>
+            <a:r>
+              <a:rPr lang="hu-HU" dirty="0"/>
+              <a:t> a modern webalkalmazások működéséről és fejlesztési folyamatairól.  </a:t>
             </a:r>
           </a:p>
         </p:txBody>
@@ -16042,7 +16090,7 @@
             </a:pPr>
             <a:r>
               <a:rPr lang="hu-HU" sz="1400" dirty="0"/>
-              <a:t>Az egész project ezen része jelentette talán a legnagyobb kihívást számomra. Számos módszert, technikát alkalmaztam egyetlen feladat sikeres végrehajtásához:</a:t>
+              <a:t>Az egész project ezen része jelentette talán a legnagyobb kihívást számunkra. Számos módszert, technikát alkalmaztunk egyetlen feladat sikeres végrehajtásához:</a:t>
             </a:r>
           </a:p>
           <a:p>
@@ -16366,7 +16414,7 @@
             </a:r>
             <a:r>
               <a:rPr lang="hu-HU" sz="1400" dirty="0"/>
-              <a:t>-ban megírt kód révén egy adatbázisból kértem le a szükséges adatokat további feldolgozáshoz. Az </a:t>
+              <a:t>-ban megírt kód révén egy adatbázisból kérjük le a szükséges adatokat további feldolgozáshoz. Az </a:t>
             </a:r>
             <a:r>
               <a:rPr lang="hu-HU" sz="1400" dirty="0" err="1"/>
@@ -16374,7 +16422,7 @@
             </a:r>
             <a:r>
               <a:rPr lang="hu-HU" sz="1400" dirty="0"/>
-              <a:t> lekérdezésben használtam:</a:t>
+              <a:t> lekérdezésben használtunk:</a:t>
             </a:r>
           </a:p>
           <a:p>
@@ -17093,7 +17141,7 @@
             </a:pPr>
             <a:r>
               <a:rPr lang="hu-HU" sz="1400" dirty="0"/>
-              <a:t>A soronként kinyert adatokat változókba mentettem, majd egy $</a:t>
+              <a:t>A soronként kinyert adatokat változókba mentjük, majd egy $</a:t>
             </a:r>
             <a:r>
               <a:rPr lang="hu-HU" sz="1400" dirty="0" err="1"/>
@@ -17101,7 +17149,7 @@
             </a:r>
             <a:r>
               <a:rPr lang="hu-HU" sz="1400" dirty="0"/>
-              <a:t> nevű tömbhöz hozzáadtam őket.</a:t>
+              <a:t> nevű tömbhöz hozzáadjuk őket.</a:t>
             </a:r>
           </a:p>
           <a:p>
@@ -17110,7 +17158,7 @@
             </a:pPr>
             <a:r>
               <a:rPr lang="hu-HU" sz="1400" dirty="0"/>
-              <a:t>Gyerekeknél csak a 16 évnél fiatalabbak adatait adom hozzá.</a:t>
+              <a:t>Gyerekeknél csak a 16 évnél fiatalabbak adatait adjuk hozzá.</a:t>
             </a:r>
           </a:p>
           <a:p>
@@ -17119,7 +17167,7 @@
             </a:pPr>
             <a:r>
               <a:rPr lang="hu-HU" sz="1400" dirty="0"/>
-              <a:t>Növelem egyel a gyerekek számát és betegek számát ha van.</a:t>
+              <a:t>Növeljük egyel a gyerekek számát és betegek számát ha van.</a:t>
             </a:r>
           </a:p>
           <a:p>
@@ -17420,7 +17468,7 @@
             </a:pPr>
             <a:r>
               <a:rPr lang="hu-HU" sz="1400" dirty="0"/>
-              <a:t>Az adatokat tartalmazó tömböt konvertáltam JSON értékké.</a:t>
+              <a:t>Az adatokat tartalmazó tömböt konvertáljuk JSON értékké.</a:t>
             </a:r>
             <a:endParaRPr lang="hu-HU" dirty="0"/>
           </a:p>
@@ -18318,7 +18366,7 @@
             </a:pPr>
             <a:r>
               <a:rPr lang="hu-HU" sz="1400" dirty="0"/>
-              <a:t>A visszakapott adatokat használva egy JavaScript függvénnyel végeztem el a számítást, és rajzoltam ki a táblázatot:</a:t>
+              <a:t>A visszakapott adatokat használva egy JavaScript függvénnyel végezzük el a számítást, és rajzoljuk ki a táblázatot:</a:t>
             </a:r>
           </a:p>
           <a:p>

</xml_diff>